<commit_message>
subida el 30 de junio
</commit_message>
<xml_diff>
--- a/Para hacer ilustraciones.pptx
+++ b/Para hacer ilustraciones.pptx
@@ -262,7 +262,7 @@
           <a:p>
             <a:fld id="{4035A556-7B5A-4880-844C-AB159F6919D0}" type="datetimeFigureOut">
               <a:rPr lang="es-ES" smtClean="0"/>
-              <a:t>08/05/2020</a:t>
+              <a:t>24/06/2020</a:t>
             </a:fld>
             <a:endParaRPr lang="es-ES"/>
           </a:p>
@@ -460,7 +460,7 @@
           <a:p>
             <a:fld id="{4035A556-7B5A-4880-844C-AB159F6919D0}" type="datetimeFigureOut">
               <a:rPr lang="es-ES" smtClean="0"/>
-              <a:t>08/05/2020</a:t>
+              <a:t>24/06/2020</a:t>
             </a:fld>
             <a:endParaRPr lang="es-ES"/>
           </a:p>
@@ -668,7 +668,7 @@
           <a:p>
             <a:fld id="{4035A556-7B5A-4880-844C-AB159F6919D0}" type="datetimeFigureOut">
               <a:rPr lang="es-ES" smtClean="0"/>
-              <a:t>08/05/2020</a:t>
+              <a:t>24/06/2020</a:t>
             </a:fld>
             <a:endParaRPr lang="es-ES"/>
           </a:p>
@@ -866,7 +866,7 @@
           <a:p>
             <a:fld id="{4035A556-7B5A-4880-844C-AB159F6919D0}" type="datetimeFigureOut">
               <a:rPr lang="es-ES" smtClean="0"/>
-              <a:t>08/05/2020</a:t>
+              <a:t>24/06/2020</a:t>
             </a:fld>
             <a:endParaRPr lang="es-ES"/>
           </a:p>
@@ -1141,7 +1141,7 @@
           <a:p>
             <a:fld id="{4035A556-7B5A-4880-844C-AB159F6919D0}" type="datetimeFigureOut">
               <a:rPr lang="es-ES" smtClean="0"/>
-              <a:t>08/05/2020</a:t>
+              <a:t>24/06/2020</a:t>
             </a:fld>
             <a:endParaRPr lang="es-ES"/>
           </a:p>
@@ -1406,7 +1406,7 @@
           <a:p>
             <a:fld id="{4035A556-7B5A-4880-844C-AB159F6919D0}" type="datetimeFigureOut">
               <a:rPr lang="es-ES" smtClean="0"/>
-              <a:t>08/05/2020</a:t>
+              <a:t>24/06/2020</a:t>
             </a:fld>
             <a:endParaRPr lang="es-ES"/>
           </a:p>
@@ -1818,7 +1818,7 @@
           <a:p>
             <a:fld id="{4035A556-7B5A-4880-844C-AB159F6919D0}" type="datetimeFigureOut">
               <a:rPr lang="es-ES" smtClean="0"/>
-              <a:t>08/05/2020</a:t>
+              <a:t>24/06/2020</a:t>
             </a:fld>
             <a:endParaRPr lang="es-ES"/>
           </a:p>
@@ -1959,7 +1959,7 @@
           <a:p>
             <a:fld id="{4035A556-7B5A-4880-844C-AB159F6919D0}" type="datetimeFigureOut">
               <a:rPr lang="es-ES" smtClean="0"/>
-              <a:t>08/05/2020</a:t>
+              <a:t>24/06/2020</a:t>
             </a:fld>
             <a:endParaRPr lang="es-ES"/>
           </a:p>
@@ -2072,7 +2072,7 @@
           <a:p>
             <a:fld id="{4035A556-7B5A-4880-844C-AB159F6919D0}" type="datetimeFigureOut">
               <a:rPr lang="es-ES" smtClean="0"/>
-              <a:t>08/05/2020</a:t>
+              <a:t>24/06/2020</a:t>
             </a:fld>
             <a:endParaRPr lang="es-ES"/>
           </a:p>
@@ -2383,7 +2383,7 @@
           <a:p>
             <a:fld id="{4035A556-7B5A-4880-844C-AB159F6919D0}" type="datetimeFigureOut">
               <a:rPr lang="es-ES" smtClean="0"/>
-              <a:t>08/05/2020</a:t>
+              <a:t>24/06/2020</a:t>
             </a:fld>
             <a:endParaRPr lang="es-ES"/>
           </a:p>
@@ -2671,7 +2671,7 @@
           <a:p>
             <a:fld id="{4035A556-7B5A-4880-844C-AB159F6919D0}" type="datetimeFigureOut">
               <a:rPr lang="es-ES" smtClean="0"/>
-              <a:t>08/05/2020</a:t>
+              <a:t>24/06/2020</a:t>
             </a:fld>
             <a:endParaRPr lang="es-ES"/>
           </a:p>
@@ -2912,7 +2912,7 @@
           <a:p>
             <a:fld id="{4035A556-7B5A-4880-844C-AB159F6919D0}" type="datetimeFigureOut">
               <a:rPr lang="es-ES" smtClean="0"/>
-              <a:t>08/05/2020</a:t>
+              <a:t>24/06/2020</a:t>
             </a:fld>
             <a:endParaRPr lang="es-ES"/>
           </a:p>
@@ -3381,10 +3381,10 @@
       </p:sp>
       <p:pic>
         <p:nvPicPr>
-          <p:cNvPr id="8" name="Imagen 7">
-            <a:extLst>
-              <a:ext uri="{FF2B5EF4-FFF2-40B4-BE49-F238E27FC236}">
-                <a16:creationId xmlns:a16="http://schemas.microsoft.com/office/drawing/2014/main" id="{1FC60D52-5AE1-4F57-8F5A-841681E4FDA8}"/>
+          <p:cNvPr id="20" name="Imagen 19">
+            <a:extLst>
+              <a:ext uri="{FF2B5EF4-FFF2-40B4-BE49-F238E27FC236}">
+                <a16:creationId xmlns:a16="http://schemas.microsoft.com/office/drawing/2014/main" id="{1128363F-ADB0-4133-8FE5-2F0F3DF5E45D}"/>
               </a:ext>
             </a:extLst>
           </p:cNvPr>
@@ -3407,8 +3407,8 @@
         </p:blipFill>
         <p:spPr>
           <a:xfrm>
-            <a:off x="8548226" y="0"/>
-            <a:ext cx="3167539" cy="6858000"/>
+            <a:off x="44073" y="1887739"/>
+            <a:ext cx="2995297" cy="2995297"/>
           </a:xfrm>
           <a:prstGeom prst="rect">
             <a:avLst/>
@@ -3417,10 +3417,10 @@
       </p:pic>
       <p:pic>
         <p:nvPicPr>
-          <p:cNvPr id="13" name="Imagen 12">
-            <a:extLst>
-              <a:ext uri="{FF2B5EF4-FFF2-40B4-BE49-F238E27FC236}">
-                <a16:creationId xmlns:a16="http://schemas.microsoft.com/office/drawing/2014/main" id="{94824865-A1B7-4031-A4DE-C15B8D02BCE3}"/>
+          <p:cNvPr id="22" name="Imagen 21">
+            <a:extLst>
+              <a:ext uri="{FF2B5EF4-FFF2-40B4-BE49-F238E27FC236}">
+                <a16:creationId xmlns:a16="http://schemas.microsoft.com/office/drawing/2014/main" id="{BF2EC0C5-377D-4344-91B0-43DE804038AF}"/>
               </a:ext>
             </a:extLst>
           </p:cNvPr>
@@ -3443,8 +3443,8 @@
         </p:blipFill>
         <p:spPr>
           <a:xfrm>
-            <a:off x="4691539" y="0"/>
-            <a:ext cx="3167539" cy="6858000"/>
+            <a:off x="3039370" y="1887739"/>
+            <a:ext cx="5724525" cy="2905125"/>
           </a:xfrm>
           <a:prstGeom prst="rect">
             <a:avLst/>
@@ -3453,10 +3453,10 @@
       </p:pic>
       <p:pic>
         <p:nvPicPr>
-          <p:cNvPr id="16" name="Imagen 15">
-            <a:extLst>
-              <a:ext uri="{FF2B5EF4-FFF2-40B4-BE49-F238E27FC236}">
-                <a16:creationId xmlns:a16="http://schemas.microsoft.com/office/drawing/2014/main" id="{D2514FBC-83F1-4C18-B151-E83ADFA7AA42}"/>
+          <p:cNvPr id="24" name="Imagen 23">
+            <a:extLst>
+              <a:ext uri="{FF2B5EF4-FFF2-40B4-BE49-F238E27FC236}">
+                <a16:creationId xmlns:a16="http://schemas.microsoft.com/office/drawing/2014/main" id="{20F74F8E-4502-485B-84D5-9439511154DC}"/>
               </a:ext>
             </a:extLst>
           </p:cNvPr>
@@ -3479,8 +3479,8 @@
         </p:blipFill>
         <p:spPr>
           <a:xfrm>
-            <a:off x="834852" y="0"/>
-            <a:ext cx="3167539" cy="6858000"/>
+            <a:off x="9272300" y="1902487"/>
+            <a:ext cx="2875627" cy="2875627"/>
           </a:xfrm>
           <a:prstGeom prst="rect">
             <a:avLst/>

</xml_diff>